<commit_message>
Upload Documentation, Presentation and QA documentation. Close #5
</commit_message>
<xml_diff>
--- a/Docs/Am-I-Goos.pptx
+++ b/Docs/Am-I-Goos.pptx
@@ -6742,6 +6742,18 @@
   <p:clrMapOvr>
     <a:masterClrMapping/>
   </p:clrMapOvr>
+  <mc:AlternateContent xmlns:mc="http://schemas.openxmlformats.org/markup-compatibility/2006">
+    <mc:Choice xmlns:p15="http://schemas.microsoft.com/office/powerpoint/2012/main" Requires="p15">
+      <p:transition xmlns:p14="http://schemas.microsoft.com/office/powerpoint/2010/main" spd="slow" p14:dur="1250">
+        <p15:prstTrans prst="peelOff"/>
+      </p:transition>
+    </mc:Choice>
+    <mc:Fallback>
+      <p:transition spd="slow">
+        <p:fade/>
+      </p:transition>
+    </mc:Fallback>
+  </mc:AlternateContent>
   <p:timing>
     <p:tnLst>
       <p:par>
@@ -6915,6 +6927,9 @@
   <p:clrMapOvr>
     <a:masterClrMapping/>
   </p:clrMapOvr>
+  <p:transition spd="slow">
+    <p:push dir="u"/>
+  </p:transition>
   <p:timing>
     <p:tnLst>
       <p:par>
@@ -7407,6 +7422,16 @@
   <p:clrMapOvr>
     <a:masterClrMapping/>
   </p:clrMapOvr>
+  <p:transition spd="slow">
+    <p:wipe/>
+  </p:transition>
+  <p:timing>
+    <p:tnLst>
+      <p:par>
+        <p:cTn id="1" dur="indefinite" restart="never" nodeType="tmRoot"/>
+      </p:par>
+    </p:tnLst>
+  </p:timing>
 </p:sld>
 </file>
 
@@ -7750,6 +7775,25 @@
   <p:clrMapOvr>
     <a:masterClrMapping/>
   </p:clrMapOvr>
+  <mc:AlternateContent xmlns:mc="http://schemas.openxmlformats.org/markup-compatibility/2006">
+    <mc:Choice xmlns:p14="http://schemas.microsoft.com/office/powerpoint/2010/main" Requires="p14">
+      <p:transition spd="slow" p14:dur="1500">
+        <p:split orient="vert"/>
+      </p:transition>
+    </mc:Choice>
+    <mc:Fallback>
+      <p:transition spd="slow">
+        <p:split orient="vert"/>
+      </p:transition>
+    </mc:Fallback>
+  </mc:AlternateContent>
+  <p:timing>
+    <p:tnLst>
+      <p:par>
+        <p:cTn id="1" dur="indefinite" restart="never" nodeType="tmRoot"/>
+      </p:par>
+    </p:tnLst>
+  </p:timing>
 </p:sld>
 </file>
 
@@ -8170,6 +8214,25 @@
   <p:clrMapOvr>
     <a:masterClrMapping/>
   </p:clrMapOvr>
+  <mc:AlternateContent xmlns:mc="http://schemas.openxmlformats.org/markup-compatibility/2006">
+    <mc:Choice xmlns:p14="http://schemas.microsoft.com/office/powerpoint/2010/main" Requires="p14">
+      <p:transition spd="slow">
+        <p14:flash/>
+      </p:transition>
+    </mc:Choice>
+    <mc:Fallback>
+      <p:transition spd="slow">
+        <p:fade/>
+      </p:transition>
+    </mc:Fallback>
+  </mc:AlternateContent>
+  <p:timing>
+    <p:tnLst>
+      <p:par>
+        <p:cTn id="1" dur="indefinite" restart="never" nodeType="tmRoot"/>
+      </p:par>
+    </p:tnLst>
+  </p:timing>
 </p:sld>
 </file>
 
@@ -8281,6 +8344,16 @@
   <p:clrMapOvr>
     <a:masterClrMapping/>
   </p:clrMapOvr>
+  <p:transition spd="slow">
+    <p:cover/>
+  </p:transition>
+  <p:timing>
+    <p:tnLst>
+      <p:par>
+        <p:cTn id="1" dur="indefinite" restart="never" nodeType="tmRoot"/>
+      </p:par>
+    </p:tnLst>
+  </p:timing>
 </p:sld>
 </file>
 
@@ -8354,6 +8427,16 @@
   <p:clrMapOvr>
     <a:masterClrMapping/>
   </p:clrMapOvr>
+  <p:transition spd="med">
+    <p:pull/>
+  </p:transition>
+  <p:timing>
+    <p:tnLst>
+      <p:par>
+        <p:cTn id="1" dur="indefinite" restart="never" nodeType="tmRoot"/>
+      </p:par>
+    </p:tnLst>
+  </p:timing>
 </p:sld>
 </file>
 
@@ -8427,6 +8510,25 @@
   <p:clrMapOvr>
     <a:masterClrMapping/>
   </p:clrMapOvr>
+  <mc:AlternateContent xmlns:mc="http://schemas.openxmlformats.org/markup-compatibility/2006">
+    <mc:Choice xmlns:p14="http://schemas.microsoft.com/office/powerpoint/2010/main" Requires="p14">
+      <p:transition spd="slow" p14:dur="800">
+        <p:circle/>
+      </p:transition>
+    </mc:Choice>
+    <mc:Fallback>
+      <p:transition spd="slow">
+        <p:circle/>
+      </p:transition>
+    </mc:Fallback>
+  </mc:AlternateContent>
+  <p:timing>
+    <p:tnLst>
+      <p:par>
+        <p:cTn id="1" dur="indefinite" restart="never" nodeType="tmRoot"/>
+      </p:par>
+    </p:tnLst>
+  </p:timing>
 </p:sld>
 </file>
 
@@ -8500,6 +8602,16 @@
   <p:clrMapOvr>
     <a:masterClrMapping/>
   </p:clrMapOvr>
+  <p:transition spd="slow">
+    <p:randomBar dir="vert"/>
+  </p:transition>
+  <p:timing>
+    <p:tnLst>
+      <p:par>
+        <p:cTn id="1" dur="indefinite" restart="never" nodeType="tmRoot"/>
+      </p:par>
+    </p:tnLst>
+  </p:timing>
 </p:sld>
 </file>
 

</xml_diff>